<commit_message>
fit together report 3 WIP
</commit_message>
<xml_diff>
--- a/reports/report2/Architecture_Diagram.pptx
+++ b/reports/report2/Architecture_Diagram.pptx
@@ -104,6 +104,11 @@
       </a:defRPr>
     </a:lvl9pPr>
   </p:defaultTextStyle>
+  <p:extLst>
+    <p:ext uri="{EFAFB233-063F-42B5-8137-9DF3F51BA10A}">
+      <p15:sldGuideLst xmlns:p15="http://schemas.microsoft.com/office/powerpoint/2012/main"/>
+    </p:ext>
+  </p:extLst>
 </p:presentation>
 </file>
 
@@ -120,12 +125,12 @@
   <pc:docChgLst>
     <pc:chgData name="Jan Haas" userId="b12d44271bc99885" providerId="LiveId" clId="{710A56C8-67C8-4EB2-B06C-33663206202E}"/>
     <pc:docChg chg="undo custSel modSld">
-      <pc:chgData name="Jan Haas" userId="b12d44271bc99885" providerId="LiveId" clId="{710A56C8-67C8-4EB2-B06C-33663206202E}" dt="2021-11-28T14:29:43.605" v="270" actId="1076"/>
+      <pc:chgData name="Jan Haas" userId="b12d44271bc99885" providerId="LiveId" clId="{710A56C8-67C8-4EB2-B06C-33663206202E}" dt="2022-01-12T14:34:52.774" v="328" actId="1076"/>
       <pc:docMkLst>
         <pc:docMk/>
       </pc:docMkLst>
       <pc:sldChg chg="addSp delSp modSp mod">
-        <pc:chgData name="Jan Haas" userId="b12d44271bc99885" providerId="LiveId" clId="{710A56C8-67C8-4EB2-B06C-33663206202E}" dt="2021-11-28T14:29:43.605" v="270" actId="1076"/>
+        <pc:chgData name="Jan Haas" userId="b12d44271bc99885" providerId="LiveId" clId="{710A56C8-67C8-4EB2-B06C-33663206202E}" dt="2022-01-12T14:34:52.774" v="328" actId="1076"/>
         <pc:sldMkLst>
           <pc:docMk/>
           <pc:sldMk cId="327007724" sldId="256"/>
@@ -163,7 +168,7 @@
           </ac:spMkLst>
         </pc:spChg>
         <pc:spChg chg="mod">
-          <ac:chgData name="Jan Haas" userId="b12d44271bc99885" providerId="LiveId" clId="{710A56C8-67C8-4EB2-B06C-33663206202E}" dt="2021-11-28T14:27:36.205" v="243" actId="1076"/>
+          <ac:chgData name="Jan Haas" userId="b12d44271bc99885" providerId="LiveId" clId="{710A56C8-67C8-4EB2-B06C-33663206202E}" dt="2022-01-12T14:34:52.774" v="328" actId="1076"/>
           <ac:spMkLst>
             <pc:docMk/>
             <pc:sldMk cId="327007724" sldId="256"/>
@@ -187,7 +192,7 @@
           </ac:spMkLst>
         </pc:spChg>
         <pc:spChg chg="add mod">
-          <ac:chgData name="Jan Haas" userId="b12d44271bc99885" providerId="LiveId" clId="{710A56C8-67C8-4EB2-B06C-33663206202E}" dt="2021-11-28T14:05:39.702" v="218" actId="1076"/>
+          <ac:chgData name="Jan Haas" userId="b12d44271bc99885" providerId="LiveId" clId="{710A56C8-67C8-4EB2-B06C-33663206202E}" dt="2022-01-12T14:33:57.618" v="300" actId="1038"/>
           <ac:spMkLst>
             <pc:docMk/>
             <pc:sldMk cId="327007724" sldId="256"/>
@@ -195,7 +200,7 @@
           </ac:spMkLst>
         </pc:spChg>
         <pc:spChg chg="add mod">
-          <ac:chgData name="Jan Haas" userId="b12d44271bc99885" providerId="LiveId" clId="{710A56C8-67C8-4EB2-B06C-33663206202E}" dt="2021-11-28T14:05:39.702" v="218" actId="1076"/>
+          <ac:chgData name="Jan Haas" userId="b12d44271bc99885" providerId="LiveId" clId="{710A56C8-67C8-4EB2-B06C-33663206202E}" dt="2022-01-12T14:33:52.828" v="298" actId="1038"/>
           <ac:spMkLst>
             <pc:docMk/>
             <pc:sldMk cId="327007724" sldId="256"/>
@@ -571,7 +576,7 @@
           <a:p>
             <a:fld id="{CAF1D50F-7B80-4DEA-8808-3DFE2EEA7560}" type="datetimeFigureOut">
               <a:rPr lang="en-US" smtClean="0"/>
-              <a:t>11/28/2021</a:t>
+              <a:t>1/12/2022</a:t>
             </a:fld>
             <a:endParaRPr lang="en-US"/>
           </a:p>
@@ -769,7 +774,7 @@
           <a:p>
             <a:fld id="{CAF1D50F-7B80-4DEA-8808-3DFE2EEA7560}" type="datetimeFigureOut">
               <a:rPr lang="en-US" smtClean="0"/>
-              <a:t>11/28/2021</a:t>
+              <a:t>1/12/2022</a:t>
             </a:fld>
             <a:endParaRPr lang="en-US"/>
           </a:p>
@@ -977,7 +982,7 @@
           <a:p>
             <a:fld id="{CAF1D50F-7B80-4DEA-8808-3DFE2EEA7560}" type="datetimeFigureOut">
               <a:rPr lang="en-US" smtClean="0"/>
-              <a:t>11/28/2021</a:t>
+              <a:t>1/12/2022</a:t>
             </a:fld>
             <a:endParaRPr lang="en-US"/>
           </a:p>
@@ -1175,7 +1180,7 @@
           <a:p>
             <a:fld id="{CAF1D50F-7B80-4DEA-8808-3DFE2EEA7560}" type="datetimeFigureOut">
               <a:rPr lang="en-US" smtClean="0"/>
-              <a:t>11/28/2021</a:t>
+              <a:t>1/12/2022</a:t>
             </a:fld>
             <a:endParaRPr lang="en-US"/>
           </a:p>
@@ -1450,7 +1455,7 @@
           <a:p>
             <a:fld id="{CAF1D50F-7B80-4DEA-8808-3DFE2EEA7560}" type="datetimeFigureOut">
               <a:rPr lang="en-US" smtClean="0"/>
-              <a:t>11/28/2021</a:t>
+              <a:t>1/12/2022</a:t>
             </a:fld>
             <a:endParaRPr lang="en-US"/>
           </a:p>
@@ -1715,7 +1720,7 @@
           <a:p>
             <a:fld id="{CAF1D50F-7B80-4DEA-8808-3DFE2EEA7560}" type="datetimeFigureOut">
               <a:rPr lang="en-US" smtClean="0"/>
-              <a:t>11/28/2021</a:t>
+              <a:t>1/12/2022</a:t>
             </a:fld>
             <a:endParaRPr lang="en-US"/>
           </a:p>
@@ -2127,7 +2132,7 @@
           <a:p>
             <a:fld id="{CAF1D50F-7B80-4DEA-8808-3DFE2EEA7560}" type="datetimeFigureOut">
               <a:rPr lang="en-US" smtClean="0"/>
-              <a:t>11/28/2021</a:t>
+              <a:t>1/12/2022</a:t>
             </a:fld>
             <a:endParaRPr lang="en-US"/>
           </a:p>
@@ -2268,7 +2273,7 @@
           <a:p>
             <a:fld id="{CAF1D50F-7B80-4DEA-8808-3DFE2EEA7560}" type="datetimeFigureOut">
               <a:rPr lang="en-US" smtClean="0"/>
-              <a:t>11/28/2021</a:t>
+              <a:t>1/12/2022</a:t>
             </a:fld>
             <a:endParaRPr lang="en-US"/>
           </a:p>
@@ -2381,7 +2386,7 @@
           <a:p>
             <a:fld id="{CAF1D50F-7B80-4DEA-8808-3DFE2EEA7560}" type="datetimeFigureOut">
               <a:rPr lang="en-US" smtClean="0"/>
-              <a:t>11/28/2021</a:t>
+              <a:t>1/12/2022</a:t>
             </a:fld>
             <a:endParaRPr lang="en-US"/>
           </a:p>
@@ -2692,7 +2697,7 @@
           <a:p>
             <a:fld id="{CAF1D50F-7B80-4DEA-8808-3DFE2EEA7560}" type="datetimeFigureOut">
               <a:rPr lang="en-US" smtClean="0"/>
-              <a:t>11/28/2021</a:t>
+              <a:t>1/12/2022</a:t>
             </a:fld>
             <a:endParaRPr lang="en-US"/>
           </a:p>
@@ -2980,7 +2985,7 @@
           <a:p>
             <a:fld id="{CAF1D50F-7B80-4DEA-8808-3DFE2EEA7560}" type="datetimeFigureOut">
               <a:rPr lang="en-US" smtClean="0"/>
-              <a:t>11/28/2021</a:t>
+              <a:t>1/12/2022</a:t>
             </a:fld>
             <a:endParaRPr lang="en-US"/>
           </a:p>
@@ -3221,7 +3226,7 @@
           <a:p>
             <a:fld id="{CAF1D50F-7B80-4DEA-8808-3DFE2EEA7560}" type="datetimeFigureOut">
               <a:rPr lang="en-US" smtClean="0"/>
-              <a:t>11/28/2021</a:t>
+              <a:t>1/12/2022</a:t>
             </a:fld>
             <a:endParaRPr lang="en-US"/>
           </a:p>
@@ -4667,8 +4672,8 @@
         </p:nvSpPr>
         <p:spPr>
           <a:xfrm>
-            <a:off x="4313371" y="912141"/>
-            <a:ext cx="859318" cy="523220"/>
+            <a:off x="4255568" y="895365"/>
+            <a:ext cx="859318" cy="738664"/>
           </a:xfrm>
           <a:prstGeom prst="rect">
             <a:avLst/>
@@ -4684,7 +4689,7 @@
             <a:pPr algn="r"/>
             <a:r>
               <a:rPr lang="en-US" sz="1400" dirty="0"/>
-              <a:t>Entry Request</a:t>
+              <a:t>Lock Entries Number</a:t>
             </a:r>
           </a:p>
         </p:txBody>
@@ -4912,7 +4917,7 @@
         </p:nvSpPr>
         <p:spPr>
           <a:xfrm>
-            <a:off x="2429825" y="5671312"/>
+            <a:off x="2448113" y="5671312"/>
             <a:ext cx="1162228" cy="338554"/>
           </a:xfrm>
           <a:prstGeom prst="rect">
@@ -4994,8 +4999,8 @@
         </p:nvSpPr>
         <p:spPr>
           <a:xfrm>
-            <a:off x="553863" y="5949328"/>
-            <a:ext cx="3038190" cy="338554"/>
+            <a:off x="755031" y="5949328"/>
+            <a:ext cx="2939145" cy="338554"/>
           </a:xfrm>
           <a:prstGeom prst="rect">
             <a:avLst/>
@@ -5010,7 +5015,7 @@
           <a:p>
             <a:r>
               <a:rPr lang="en-US" sz="1600" dirty="0"/>
-              <a:t>Reliable Causal Ordering Multicast</a:t>
+              <a:t>Reliable Total Ordering Multicast</a:t>
             </a:r>
           </a:p>
         </p:txBody>

</xml_diff>